<commit_message>
Adding prof. Tsai's original slide set
</commit_message>
<xml_diff>
--- a/docs/QS_Start_XLP_Scripts.pptx
+++ b/docs/QS_Start_XLP_Scripts.pptx
@@ -6,19 +6,20 @@
   </p:sldMasterIdLst>
   <p:sldIdLst>
     <p:sldId id="256" r:id="rId2"/>
-    <p:sldId id="257" r:id="rId3"/>
-    <p:sldId id="258" r:id="rId4"/>
-    <p:sldId id="268" r:id="rId5"/>
-    <p:sldId id="263" r:id="rId6"/>
-    <p:sldId id="264" r:id="rId7"/>
-    <p:sldId id="269" r:id="rId8"/>
-    <p:sldId id="261" r:id="rId9"/>
-    <p:sldId id="260" r:id="rId10"/>
-    <p:sldId id="267" r:id="rId11"/>
-    <p:sldId id="262" r:id="rId12"/>
-    <p:sldId id="259" r:id="rId13"/>
-    <p:sldId id="265" r:id="rId14"/>
-    <p:sldId id="266" r:id="rId15"/>
+    <p:sldId id="270" r:id="rId3"/>
+    <p:sldId id="257" r:id="rId4"/>
+    <p:sldId id="258" r:id="rId5"/>
+    <p:sldId id="268" r:id="rId6"/>
+    <p:sldId id="263" r:id="rId7"/>
+    <p:sldId id="264" r:id="rId8"/>
+    <p:sldId id="269" r:id="rId9"/>
+    <p:sldId id="261" r:id="rId10"/>
+    <p:sldId id="260" r:id="rId11"/>
+    <p:sldId id="267" r:id="rId12"/>
+    <p:sldId id="262" r:id="rId13"/>
+    <p:sldId id="259" r:id="rId14"/>
+    <p:sldId id="265" r:id="rId15"/>
+    <p:sldId id="266" r:id="rId16"/>
   </p:sldIdLst>
   <p:sldSz cx="9144000" cy="6858000" type="screen4x3"/>
   <p:notesSz cx="6858000" cy="9144000"/>
@@ -301,7 +302,7 @@
           <a:p>
             <a:fld id="{A9C8FA95-D795-1E41-94CF-124431C0FEF0}" type="datetimeFigureOut">
               <a:rPr lang="en-US" smtClean="0"/>
-              <a:t>3/12/14</a:t>
+              <a:t>4/12/14</a:t>
             </a:fld>
             <a:endParaRPr lang="en-US"/>
           </a:p>
@@ -471,7 +472,7 @@
           <a:p>
             <a:fld id="{A9C8FA95-D795-1E41-94CF-124431C0FEF0}" type="datetimeFigureOut">
               <a:rPr lang="en-US" smtClean="0"/>
-              <a:t>3/12/14</a:t>
+              <a:t>4/12/14</a:t>
             </a:fld>
             <a:endParaRPr lang="en-US"/>
           </a:p>
@@ -651,7 +652,7 @@
           <a:p>
             <a:fld id="{A9C8FA95-D795-1E41-94CF-124431C0FEF0}" type="datetimeFigureOut">
               <a:rPr lang="en-US" smtClean="0"/>
-              <a:t>3/12/14</a:t>
+              <a:t>4/12/14</a:t>
             </a:fld>
             <a:endParaRPr lang="en-US"/>
           </a:p>
@@ -821,7 +822,7 @@
           <a:p>
             <a:fld id="{A9C8FA95-D795-1E41-94CF-124431C0FEF0}" type="datetimeFigureOut">
               <a:rPr lang="en-US" smtClean="0"/>
-              <a:t>3/12/14</a:t>
+              <a:t>4/12/14</a:t>
             </a:fld>
             <a:endParaRPr lang="en-US"/>
           </a:p>
@@ -1067,7 +1068,7 @@
           <a:p>
             <a:fld id="{A9C8FA95-D795-1E41-94CF-124431C0FEF0}" type="datetimeFigureOut">
               <a:rPr lang="en-US" smtClean="0"/>
-              <a:t>3/12/14</a:t>
+              <a:t>4/12/14</a:t>
             </a:fld>
             <a:endParaRPr lang="en-US"/>
           </a:p>
@@ -1355,7 +1356,7 @@
           <a:p>
             <a:fld id="{A9C8FA95-D795-1E41-94CF-124431C0FEF0}" type="datetimeFigureOut">
               <a:rPr lang="en-US" smtClean="0"/>
-              <a:t>3/12/14</a:t>
+              <a:t>4/12/14</a:t>
             </a:fld>
             <a:endParaRPr lang="en-US"/>
           </a:p>
@@ -1777,7 +1778,7 @@
           <a:p>
             <a:fld id="{A9C8FA95-D795-1E41-94CF-124431C0FEF0}" type="datetimeFigureOut">
               <a:rPr lang="en-US" smtClean="0"/>
-              <a:t>3/12/14</a:t>
+              <a:t>4/12/14</a:t>
             </a:fld>
             <a:endParaRPr lang="en-US"/>
           </a:p>
@@ -1895,7 +1896,7 @@
           <a:p>
             <a:fld id="{A9C8FA95-D795-1E41-94CF-124431C0FEF0}" type="datetimeFigureOut">
               <a:rPr lang="en-US" smtClean="0"/>
-              <a:t>3/12/14</a:t>
+              <a:t>4/12/14</a:t>
             </a:fld>
             <a:endParaRPr lang="en-US"/>
           </a:p>
@@ -1990,7 +1991,7 @@
           <a:p>
             <a:fld id="{A9C8FA95-D795-1E41-94CF-124431C0FEF0}" type="datetimeFigureOut">
               <a:rPr lang="en-US" smtClean="0"/>
-              <a:t>3/12/14</a:t>
+              <a:t>4/12/14</a:t>
             </a:fld>
             <a:endParaRPr lang="en-US"/>
           </a:p>
@@ -2267,7 +2268,7 @@
           <a:p>
             <a:fld id="{A9C8FA95-D795-1E41-94CF-124431C0FEF0}" type="datetimeFigureOut">
               <a:rPr lang="en-US" smtClean="0"/>
-              <a:t>3/12/14</a:t>
+              <a:t>4/12/14</a:t>
             </a:fld>
             <a:endParaRPr lang="en-US"/>
           </a:p>
@@ -2520,7 +2521,7 @@
           <a:p>
             <a:fld id="{A9C8FA95-D795-1E41-94CF-124431C0FEF0}" type="datetimeFigureOut">
               <a:rPr lang="en-US" smtClean="0"/>
-              <a:t>3/12/14</a:t>
+              <a:t>4/12/14</a:t>
             </a:fld>
             <a:endParaRPr lang="en-US"/>
           </a:p>
@@ -2733,7 +2734,7 @@
           <a:p>
             <a:fld id="{A9C8FA95-D795-1E41-94CF-124431C0FEF0}" type="datetimeFigureOut">
               <a:rPr lang="en-US" smtClean="0"/>
-              <a:t>3/12/14</a:t>
+              <a:t>4/12/14</a:t>
             </a:fld>
             <a:endParaRPr lang="en-US"/>
           </a:p>
@@ -3194,7 +3195,7 @@
           <a:p>
             <a:r>
               <a:rPr lang="en-US" dirty="0" smtClean="0"/>
-              <a:t>Example 2</a:t>
+              <a:t>Example 1</a:t>
             </a:r>
             <a:endParaRPr lang="en-US" dirty="0"/>
           </a:p>
@@ -3212,41 +3213,58 @@
         </p:nvSpPr>
         <p:spPr/>
         <p:txBody>
-          <a:bodyPr>
-            <a:normAutofit/>
-          </a:bodyPr>
-          <a:lstStyle/>
-          <a:p>
-            <a:r>
-              <a:rPr lang="en-US" dirty="0" smtClean="0"/>
-              <a:t>Constitution Revision Process</a:t>
+          <a:bodyPr/>
+          <a:lstStyle/>
+          <a:p>
+            <a:r>
+              <a:rPr lang="en-US" dirty="0" smtClean="0"/>
+              <a:t>Unmanned Island Exploration</a:t>
             </a:r>
           </a:p>
           <a:p>
             <a:pPr lvl="1"/>
             <a:r>
               <a:rPr lang="en-US" dirty="0" smtClean="0"/>
-              <a:t>High School students writing Const. for </a:t>
-            </a:r>
-            <a:r>
-              <a:rPr lang="en-US" dirty="0" err="1" smtClean="0"/>
-              <a:t>Hackerspaces</a:t>
-            </a:r>
+              <a:t>Functional Prototypes, using industry strength technology solutions</a:t>
+            </a:r>
+          </a:p>
+          <a:p>
+            <a:pPr lvl="1"/>
+            <a:r>
+              <a:rPr lang="en-US" dirty="0" smtClean="0"/>
+              <a:t>Promotional Videos and</a:t>
+            </a:r>
+          </a:p>
+          <a:p>
+            <a:pPr lvl="1"/>
+            <a:r>
+              <a:rPr lang="en-US" dirty="0" smtClean="0"/>
+              <a:t>Write Budgets and Operational Proposals</a:t>
+            </a:r>
+          </a:p>
+          <a:p>
+            <a:pPr lvl="1"/>
+            <a:r>
+              <a:rPr lang="en-US" dirty="0" smtClean="0"/>
+              <a:t>International Dispute Resolution </a:t>
+            </a:r>
+            <a:r>
+              <a:rPr lang="en-US" dirty="0" smtClean="0"/>
+              <a:t>Procedures</a:t>
+            </a:r>
+          </a:p>
+          <a:p>
+            <a:r>
+              <a:rPr lang="en-US" dirty="0" smtClean="0"/>
+              <a:t>Outcomes:</a:t>
+            </a:r>
+          </a:p>
+          <a:p>
+            <a:pPr lvl="1"/>
             <a:endParaRPr lang="en-US" dirty="0" smtClean="0"/>
           </a:p>
           <a:p>
             <a:pPr lvl="1"/>
-            <a:r>
-              <a:rPr lang="en-US" dirty="0" smtClean="0"/>
-              <a:t>Revised by a group of Vocational School Professors in two day XLP event</a:t>
-            </a:r>
-          </a:p>
-          <a:p>
-            <a:pPr lvl="1"/>
-            <a:r>
-              <a:rPr lang="en-US" dirty="0" smtClean="0"/>
-              <a:t>Led 18 University’s Directors of Engineering Training Centers to write Collaborative Agreements to share courses and technological resources across the country</a:t>
-            </a:r>
             <a:endParaRPr lang="en-US" dirty="0"/>
           </a:p>
         </p:txBody>
@@ -3254,7 +3272,7 @@
     </p:spTree>
     <p:extLst>
       <p:ext uri="{BB962C8B-B14F-4D97-AF65-F5344CB8AC3E}">
-        <p14:creationId xmlns:p14="http://schemas.microsoft.com/office/powerpoint/2010/main" val="1374444708"/>
+        <p14:creationId xmlns:p14="http://schemas.microsoft.com/office/powerpoint/2010/main" val="1810960128"/>
       </p:ext>
     </p:extLst>
   </p:cSld>
@@ -3304,8 +3322,8 @@
           <a:lstStyle/>
           <a:p>
             <a:r>
-              <a:rPr lang="en-US" dirty="0" err="1" smtClean="0"/>
-              <a:t>ReCombination</a:t>
+              <a:rPr lang="en-US" dirty="0" smtClean="0"/>
+              <a:t>Example 2</a:t>
             </a:r>
             <a:endParaRPr lang="en-US" dirty="0"/>
           </a:p>
@@ -3330,36 +3348,42 @@
           <a:p>
             <a:r>
               <a:rPr lang="en-US" dirty="0" smtClean="0"/>
-              <a:t>Human Talents</a:t>
-            </a:r>
-          </a:p>
-          <a:p>
-            <a:r>
-              <a:rPr lang="en-US" dirty="0" smtClean="0"/>
-              <a:t>Technological and</a:t>
-            </a:r>
-          </a:p>
-          <a:p>
-            <a:r>
-              <a:rPr lang="en-US" dirty="0" smtClean="0"/>
-              <a:t>Social Resource</a:t>
-            </a:r>
-          </a:p>
-          <a:p>
+              <a:t>Constitution Revision Process</a:t>
+            </a:r>
+          </a:p>
+          <a:p>
+            <a:pPr lvl="1"/>
+            <a:r>
+              <a:rPr lang="en-US" dirty="0" smtClean="0"/>
+              <a:t>High School students writing Const. for </a:t>
+            </a:r>
+            <a:r>
+              <a:rPr lang="en-US" dirty="0" err="1" smtClean="0"/>
+              <a:t>Hackerspaces</a:t>
+            </a:r>
+            <a:endParaRPr lang="en-US" dirty="0" smtClean="0"/>
+          </a:p>
+          <a:p>
+            <a:pPr lvl="1"/>
+            <a:r>
+              <a:rPr lang="en-US" dirty="0" smtClean="0"/>
+              <a:t>Revised by a group of Vocational School Professors in two day XLP event</a:t>
+            </a:r>
+          </a:p>
+          <a:p>
+            <a:pPr lvl="1"/>
+            <a:r>
+              <a:rPr lang="en-US" dirty="0" smtClean="0"/>
+              <a:t>Led 18 University’s Directors of Engineering Training Centers to write Collaborative Agreements to share courses and technological resources across the country</a:t>
+            </a:r>
             <a:endParaRPr lang="en-US" dirty="0"/>
-          </a:p>
-          <a:p>
-            <a:r>
-              <a:rPr lang="en-US" dirty="0" smtClean="0"/>
-              <a:t>Relating Digital Identities with above resources with their publicly witnessed Agreements and Digital Legacy with precise time and location stamps</a:t>
-            </a:r>
           </a:p>
         </p:txBody>
       </p:sp>
     </p:spTree>
     <p:extLst>
       <p:ext uri="{BB962C8B-B14F-4D97-AF65-F5344CB8AC3E}">
-        <p14:creationId xmlns:p14="http://schemas.microsoft.com/office/powerpoint/2010/main" val="3673003299"/>
+        <p14:creationId xmlns:p14="http://schemas.microsoft.com/office/powerpoint/2010/main" val="1374444708"/>
       </p:ext>
     </p:extLst>
   </p:cSld>
@@ -3409,8 +3433,8 @@
           <a:lstStyle/>
           <a:p>
             <a:r>
-              <a:rPr lang="en-US" dirty="0" smtClean="0"/>
-              <a:t>Enable Massive Distribution</a:t>
+              <a:rPr lang="en-US" dirty="0" err="1" smtClean="0"/>
+              <a:t>ReCombination</a:t>
             </a:r>
             <a:endParaRPr lang="en-US" dirty="0"/>
           </a:p>
@@ -3428,40 +3452,43 @@
         </p:nvSpPr>
         <p:spPr/>
         <p:txBody>
-          <a:bodyPr/>
-          <a:lstStyle/>
-          <a:p>
-            <a:r>
-              <a:rPr lang="en-US" dirty="0" smtClean="0"/>
-              <a:t>Using the Internet as an Vehicle to deliver learning opportunities digitally</a:t>
-            </a:r>
-          </a:p>
-          <a:p>
-            <a:r>
-              <a:rPr lang="en-US" dirty="0" smtClean="0"/>
-              <a:t>Levering Open Source Technologies and </a:t>
-            </a:r>
-          </a:p>
-          <a:p>
-            <a:r>
-              <a:rPr lang="en-US" dirty="0" smtClean="0"/>
-              <a:t>Legal Instruments invented in the Digital Age</a:t>
-            </a:r>
-          </a:p>
-          <a:p>
-            <a:pPr lvl="1"/>
-            <a:r>
-              <a:rPr lang="en-US" dirty="0" smtClean="0"/>
-              <a:t>Creative Commons Licensing Agreements</a:t>
-            </a:r>
+          <a:bodyPr>
+            <a:normAutofit/>
+          </a:bodyPr>
+          <a:lstStyle/>
+          <a:p>
+            <a:r>
+              <a:rPr lang="en-US" dirty="0" smtClean="0"/>
+              <a:t>Human Talents</a:t>
+            </a:r>
+          </a:p>
+          <a:p>
+            <a:r>
+              <a:rPr lang="en-US" dirty="0" smtClean="0"/>
+              <a:t>Technological and</a:t>
+            </a:r>
+          </a:p>
+          <a:p>
+            <a:r>
+              <a:rPr lang="en-US" dirty="0" smtClean="0"/>
+              <a:t>Social Resource</a:t>
+            </a:r>
+          </a:p>
+          <a:p>
             <a:endParaRPr lang="en-US" dirty="0"/>
+          </a:p>
+          <a:p>
+            <a:r>
+              <a:rPr lang="en-US" dirty="0" smtClean="0"/>
+              <a:t>Relating Digital Identities with above resources with their publicly witnessed Agreements and Digital Legacy with precise time and location stamps</a:t>
+            </a:r>
           </a:p>
         </p:txBody>
       </p:sp>
     </p:spTree>
     <p:extLst>
       <p:ext uri="{BB962C8B-B14F-4D97-AF65-F5344CB8AC3E}">
-        <p14:creationId xmlns:p14="http://schemas.microsoft.com/office/powerpoint/2010/main" val="1007711662"/>
+        <p14:creationId xmlns:p14="http://schemas.microsoft.com/office/powerpoint/2010/main" val="3673003299"/>
       </p:ext>
     </p:extLst>
   </p:cSld>
@@ -3512,6 +3539,108 @@
           <a:p>
             <a:r>
               <a:rPr lang="en-US" dirty="0" smtClean="0"/>
+              <a:t>Enable Massive Distribution</a:t>
+            </a:r>
+            <a:endParaRPr lang="en-US" dirty="0"/>
+          </a:p>
+        </p:txBody>
+      </p:sp>
+      <p:sp>
+        <p:nvSpPr>
+          <p:cNvPr id="3" name="Content Placeholder 2"/>
+          <p:cNvSpPr>
+            <a:spLocks noGrp="1"/>
+          </p:cNvSpPr>
+          <p:nvPr>
+            <p:ph idx="1"/>
+          </p:nvPr>
+        </p:nvSpPr>
+        <p:spPr/>
+        <p:txBody>
+          <a:bodyPr/>
+          <a:lstStyle/>
+          <a:p>
+            <a:r>
+              <a:rPr lang="en-US" dirty="0" smtClean="0"/>
+              <a:t>Using the Internet as an Vehicle to deliver learning opportunities digitally</a:t>
+            </a:r>
+          </a:p>
+          <a:p>
+            <a:r>
+              <a:rPr lang="en-US" dirty="0" smtClean="0"/>
+              <a:t>Levering Open Source Technologies and </a:t>
+            </a:r>
+          </a:p>
+          <a:p>
+            <a:r>
+              <a:rPr lang="en-US" dirty="0" smtClean="0"/>
+              <a:t>Legal Instruments invented in the Digital Age</a:t>
+            </a:r>
+          </a:p>
+          <a:p>
+            <a:pPr lvl="1"/>
+            <a:r>
+              <a:rPr lang="en-US" dirty="0" smtClean="0"/>
+              <a:t>Creative Commons Licensing Agreements</a:t>
+            </a:r>
+            <a:endParaRPr lang="en-US" dirty="0"/>
+          </a:p>
+        </p:txBody>
+      </p:sp>
+    </p:spTree>
+    <p:extLst>
+      <p:ext uri="{BB962C8B-B14F-4D97-AF65-F5344CB8AC3E}">
+        <p14:creationId xmlns:p14="http://schemas.microsoft.com/office/powerpoint/2010/main" val="1007711662"/>
+      </p:ext>
+    </p:extLst>
+  </p:cSld>
+  <p:clrMapOvr>
+    <a:masterClrMapping/>
+  </p:clrMapOvr>
+  <p:timing>
+    <p:tnLst>
+      <p:par>
+        <p:cTn xmlns:p14="http://schemas.microsoft.com/office/powerpoint/2010/main" id="1" dur="indefinite" restart="never" nodeType="tmRoot"/>
+      </p:par>
+    </p:tnLst>
+  </p:timing>
+</p:sld>
+</file>
+
+<file path=ppt/slides/slide14.xml><?xml version="1.0" encoding="utf-8"?>
+<p:sld xmlns:a="http://schemas.openxmlformats.org/drawingml/2006/main" xmlns:r="http://schemas.openxmlformats.org/officeDocument/2006/relationships" xmlns:p="http://schemas.openxmlformats.org/presentationml/2006/main">
+  <p:cSld>
+    <p:spTree>
+      <p:nvGrpSpPr>
+        <p:cNvPr id="1" name=""/>
+        <p:cNvGrpSpPr/>
+        <p:nvPr/>
+      </p:nvGrpSpPr>
+      <p:grpSpPr>
+        <a:xfrm>
+          <a:off x="0" y="0"/>
+          <a:ext cx="0" cy="0"/>
+          <a:chOff x="0" y="0"/>
+          <a:chExt cx="0" cy="0"/>
+        </a:xfrm>
+      </p:grpSpPr>
+      <p:sp>
+        <p:nvSpPr>
+          <p:cNvPr id="2" name="Title 1"/>
+          <p:cNvSpPr>
+            <a:spLocks noGrp="1"/>
+          </p:cNvSpPr>
+          <p:nvPr>
+            <p:ph type="title"/>
+          </p:nvPr>
+        </p:nvSpPr>
+        <p:spPr/>
+        <p:txBody>
+          <a:bodyPr/>
+          <a:lstStyle/>
+          <a:p>
+            <a:r>
+              <a:rPr lang="en-US" dirty="0" smtClean="0"/>
               <a:t>Institutionalized Wisdom</a:t>
             </a:r>
             <a:endParaRPr lang="en-US" dirty="0"/>
@@ -3583,7 +3712,7 @@
 </p:sld>
 </file>
 
-<file path=ppt/slides/slide14.xml><?xml version="1.0" encoding="utf-8"?>
+<file path=ppt/slides/slide15.xml><?xml version="1.0" encoding="utf-8"?>
 <p:sld xmlns:a="http://schemas.openxmlformats.org/drawingml/2006/main" xmlns:r="http://schemas.openxmlformats.org/officeDocument/2006/relationships" xmlns:p="http://schemas.openxmlformats.org/presentationml/2006/main">
   <p:cSld>
     <p:spTree>
@@ -3704,69 +3833,79 @@
           <a:bodyPr/>
           <a:lstStyle/>
           <a:p>
-            <a:r>
-              <a:rPr lang="en-US" dirty="0" smtClean="0"/>
-              <a:t>Modern Educators’ </a:t>
-            </a:r>
-            <a:r>
-              <a:rPr lang="en-US" dirty="0" err="1" smtClean="0"/>
-              <a:t>Dillema</a:t>
+            <a:endParaRPr lang="en-US"/>
+          </a:p>
+        </p:txBody>
+      </p:sp>
+      <p:sp>
+        <p:nvSpPr>
+          <p:cNvPr id="3" name="Content Placeholder 2"/>
+          <p:cNvSpPr>
+            <a:spLocks noGrp="1"/>
+          </p:cNvSpPr>
+          <p:nvPr>
+            <p:ph idx="1"/>
+          </p:nvPr>
+        </p:nvSpPr>
+        <p:spPr/>
+        <p:txBody>
+          <a:bodyPr>
+            <a:normAutofit fontScale="77500" lnSpcReduction="20000"/>
+          </a:bodyPr>
+          <a:lstStyle/>
+          <a:p>
+            <a:r>
+              <a:rPr lang="en-US" dirty="0" smtClean="0"/>
+              <a:t>XLP is a methodology for designing crowd-based learning activities. (Collaborative Learning)</a:t>
+            </a:r>
+          </a:p>
+          <a:p>
+            <a:r>
+              <a:rPr lang="en-US" dirty="0" smtClean="0"/>
+              <a:t>It can facilitate </a:t>
+            </a:r>
+          </a:p>
+          <a:p>
+            <a:r>
+              <a:rPr lang="en-US" dirty="0" smtClean="0"/>
+              <a:t>It enables communities of learners to design, develop, and implement learning activities.</a:t>
+            </a:r>
+          </a:p>
+          <a:p>
+            <a:r>
+              <a:rPr lang="en-US" dirty="0" smtClean="0"/>
+              <a:t>These communities of learners can be of any size. It can consist only a few students or a combination of a number of institutions.</a:t>
+            </a:r>
+          </a:p>
+          <a:p>
+            <a:r>
+              <a:rPr lang="en-US" dirty="0" smtClean="0"/>
+              <a:t>As the number of these communities increases, and the total number of participants increases, then XLP morphs from a methodology into an operating system.</a:t>
+            </a:r>
+          </a:p>
+          <a:p>
+            <a:r>
+              <a:rPr lang="en-US" dirty="0" smtClean="0"/>
+              <a:t>As more learners of the world learns collaboratively, the individual and </a:t>
+            </a:r>
+            <a:r>
+              <a:rPr lang="en-US" smtClean="0"/>
+              <a:t>collective learning </a:t>
             </a:r>
             <a:endParaRPr lang="en-US" dirty="0"/>
-          </a:p>
-        </p:txBody>
-      </p:sp>
-      <p:sp>
-        <p:nvSpPr>
-          <p:cNvPr id="3" name="Content Placeholder 2"/>
-          <p:cNvSpPr>
-            <a:spLocks noGrp="1"/>
-          </p:cNvSpPr>
-          <p:nvPr>
-            <p:ph idx="1"/>
-          </p:nvPr>
-        </p:nvSpPr>
-        <p:spPr/>
-        <p:txBody>
-          <a:bodyPr/>
-          <a:lstStyle/>
-          <a:p>
-            <a:r>
-              <a:rPr lang="en-US" dirty="0" smtClean="0"/>
-              <a:t>Objective is NOT to train students to learn what teachers know,</a:t>
-            </a:r>
-          </a:p>
-          <a:p>
-            <a:r>
-              <a:rPr lang="en-US" dirty="0" smtClean="0"/>
-              <a:t>BUT to be aware of their basic RIGHTS and Opportunities in their own lives.</a:t>
-            </a:r>
-          </a:p>
-          <a:p>
-            <a:r>
-              <a:rPr lang="en-US" dirty="0" smtClean="0"/>
-              <a:t>Enabling schools as a microcosm of the real society, so that this public resource can be the testing ground for future societies</a:t>
-            </a:r>
           </a:p>
         </p:txBody>
       </p:sp>
     </p:spTree>
     <p:extLst>
       <p:ext uri="{BB962C8B-B14F-4D97-AF65-F5344CB8AC3E}">
-        <p14:creationId xmlns:p14="http://schemas.microsoft.com/office/powerpoint/2010/main" val="2420930108"/>
+        <p14:creationId xmlns:p14="http://schemas.microsoft.com/office/powerpoint/2010/main" val="3966272326"/>
       </p:ext>
     </p:extLst>
   </p:cSld>
   <p:clrMapOvr>
     <a:masterClrMapping/>
   </p:clrMapOvr>
-  <p:timing>
-    <p:tnLst>
-      <p:par>
-        <p:cTn xmlns:p14="http://schemas.microsoft.com/office/powerpoint/2010/main" id="1" dur="indefinite" restart="never" nodeType="tmRoot"/>
-      </p:par>
-    </p:tnLst>
-  </p:timing>
 </p:sld>
 </file>
 
@@ -3804,7 +3943,11 @@
           <a:p>
             <a:r>
               <a:rPr lang="en-US" dirty="0" smtClean="0"/>
-              <a:t>Empowered by Four Basic Rights</a:t>
+              <a:t>Modern Educators’ </a:t>
+            </a:r>
+            <a:r>
+              <a:rPr lang="en-US" dirty="0" err="1" smtClean="0"/>
+              <a:t>Dillema</a:t>
             </a:r>
             <a:endParaRPr lang="en-US" dirty="0"/>
           </a:p>
@@ -3827,34 +3970,50 @@
           <a:p>
             <a:r>
               <a:rPr lang="en-US" dirty="0" smtClean="0"/>
-              <a:t>Resolve Conflicts</a:t>
-            </a:r>
-          </a:p>
-          <a:p>
-            <a:r>
-              <a:rPr lang="en-US" dirty="0" smtClean="0"/>
-              <a:t>Natural and Technological Resources</a:t>
-            </a:r>
-          </a:p>
-          <a:p>
-            <a:r>
-              <a:rPr lang="en-US" dirty="0" smtClean="0"/>
-              <a:t>Exchange Personal and Group-based Asset with proper Decision Procedures</a:t>
-            </a:r>
-          </a:p>
-          <a:p>
-            <a:r>
-              <a:rPr lang="en-US" dirty="0" smtClean="0"/>
-              <a:t>Present their own Opinions through public media</a:t>
-            </a:r>
-            <a:endParaRPr lang="en-US" dirty="0"/>
+              <a:t>Objective is NOT to train students to learn what teachers know,</a:t>
+            </a:r>
+          </a:p>
+          <a:p>
+            <a:r>
+              <a:rPr lang="en-US" dirty="0" smtClean="0"/>
+              <a:t>BUT to be aware of their basic RIGHTS and Opportunities in their own lives.</a:t>
+            </a:r>
+          </a:p>
+          <a:p>
+            <a:r>
+              <a:rPr lang="en-US" dirty="0" smtClean="0"/>
+              <a:t>Mission-based Role-Playing: </a:t>
+            </a:r>
+          </a:p>
+          <a:p>
+            <a:pPr lvl="1"/>
+            <a:r>
+              <a:rPr lang="en-US" dirty="0" smtClean="0"/>
+              <a:t>Schools </a:t>
+            </a:r>
+            <a:r>
+              <a:rPr lang="en-US" dirty="0" smtClean="0"/>
+              <a:t>as a microcosm of the real society, </a:t>
+            </a:r>
+            <a:endParaRPr lang="en-US" dirty="0" smtClean="0"/>
+          </a:p>
+          <a:p>
+            <a:pPr lvl="1"/>
+            <a:r>
+              <a:rPr lang="en-US" dirty="0" smtClean="0"/>
+              <a:t>School is </a:t>
+            </a:r>
+            <a:r>
+              <a:rPr lang="en-US" dirty="0" smtClean="0"/>
+              <a:t>the testing ground for future societies</a:t>
+            </a:r>
           </a:p>
         </p:txBody>
       </p:sp>
     </p:spTree>
     <p:extLst>
       <p:ext uri="{BB962C8B-B14F-4D97-AF65-F5344CB8AC3E}">
-        <p14:creationId xmlns:p14="http://schemas.microsoft.com/office/powerpoint/2010/main" val="1707451418"/>
+        <p14:creationId xmlns:p14="http://schemas.microsoft.com/office/powerpoint/2010/main" val="2420930108"/>
       </p:ext>
     </p:extLst>
   </p:cSld>
@@ -3905,7 +4064,11 @@
           <a:p>
             <a:r>
               <a:rPr lang="en-US" dirty="0" smtClean="0"/>
-              <a:t>XLP a shift from traditional model</a:t>
+              <a:t>Learners’ Four </a:t>
+            </a:r>
+            <a:r>
+              <a:rPr lang="en-US" dirty="0" smtClean="0"/>
+              <a:t>Basic Rights</a:t>
             </a:r>
             <a:endParaRPr lang="en-US" dirty="0"/>
           </a:p>
@@ -3928,28 +4091,44 @@
           <a:p>
             <a:r>
               <a:rPr lang="en-US" dirty="0" smtClean="0"/>
-              <a:t>Shifting from focusing on individual performance to</a:t>
-            </a:r>
-          </a:p>
-          <a:p>
-            <a:r>
-              <a:rPr lang="en-US" dirty="0" smtClean="0"/>
-              <a:t>Focus on the school providing a rich context for students to try out their most daring </a:t>
-            </a:r>
-            <a:r>
-              <a:rPr lang="en-US" dirty="0" err="1" smtClean="0"/>
-              <a:t>fantacies</a:t>
-            </a:r>
+              <a:t>Natural </a:t>
+            </a:r>
+            <a:r>
+              <a:rPr lang="en-US" dirty="0" smtClean="0"/>
+              <a:t>and Technological </a:t>
+            </a:r>
+            <a:r>
+              <a:rPr lang="en-US" dirty="0" smtClean="0"/>
+              <a:t>Resources</a:t>
+            </a:r>
+          </a:p>
+          <a:p>
             <a:r>
               <a:rPr lang="en-US" dirty="0"/>
-              <a:t> </a:t>
-            </a:r>
-            <a:r>
-              <a:rPr lang="en-US" dirty="0" smtClean="0"/>
-              <a:t>in a safe manner</a:t>
-            </a:r>
-          </a:p>
-          <a:p>
+              <a:t>Resolve </a:t>
+            </a:r>
+            <a:r>
+              <a:rPr lang="en-US" dirty="0" smtClean="0"/>
+              <a:t>Conflicts</a:t>
+            </a:r>
+            <a:endParaRPr lang="en-US" dirty="0" smtClean="0"/>
+          </a:p>
+          <a:p>
+            <a:r>
+              <a:rPr lang="en-US" dirty="0" smtClean="0"/>
+              <a:t>Exchange Personal and Group-based Asset with proper </a:t>
+            </a:r>
+            <a:r>
+              <a:rPr lang="en-US" dirty="0" smtClean="0"/>
+              <a:t>Discretions</a:t>
+            </a:r>
+            <a:endParaRPr lang="en-US" dirty="0" smtClean="0"/>
+          </a:p>
+          <a:p>
+            <a:r>
+              <a:rPr lang="en-US" dirty="0" smtClean="0"/>
+              <a:t>Present their own Opinions through public media</a:t>
+            </a:r>
             <a:endParaRPr lang="en-US" dirty="0"/>
           </a:p>
         </p:txBody>
@@ -3957,7 +4136,7 @@
     </p:spTree>
     <p:extLst>
       <p:ext uri="{BB962C8B-B14F-4D97-AF65-F5344CB8AC3E}">
-        <p14:creationId xmlns:p14="http://schemas.microsoft.com/office/powerpoint/2010/main" val="3783023776"/>
+        <p14:creationId xmlns:p14="http://schemas.microsoft.com/office/powerpoint/2010/main" val="1707451418"/>
       </p:ext>
     </p:extLst>
   </p:cSld>
@@ -4008,7 +4187,7 @@
           <a:p>
             <a:r>
               <a:rPr lang="en-US" dirty="0" smtClean="0"/>
-              <a:t>Mission Design</a:t>
+              <a:t>XLP a shift from traditional model</a:t>
             </a:r>
             <a:endParaRPr lang="en-US" dirty="0"/>
           </a:p>
@@ -4026,68 +4205,67 @@
         </p:nvSpPr>
         <p:spPr/>
         <p:txBody>
-          <a:bodyPr>
-            <a:normAutofit fontScale="92500" lnSpcReduction="10000"/>
-          </a:bodyPr>
-          <a:lstStyle/>
-          <a:p>
-            <a:r>
-              <a:rPr lang="en-US" dirty="0" smtClean="0"/>
-              <a:t>Guide students to write Mission Statements</a:t>
-            </a:r>
-          </a:p>
-          <a:p>
-            <a:r>
-              <a:rPr lang="en-US" dirty="0" smtClean="0"/>
-              <a:t>It takes 3-5 months, including testing out the operational plans. </a:t>
-            </a:r>
-          </a:p>
-          <a:p>
-            <a:r>
-              <a:rPr lang="en-US" dirty="0" smtClean="0"/>
-              <a:t>Participants</a:t>
+          <a:bodyPr/>
+          <a:lstStyle/>
+          <a:p>
+            <a:r>
+              <a:rPr lang="en-US" dirty="0" smtClean="0"/>
+              <a:t>From Static Content/Mature Metrics: </a:t>
             </a:r>
           </a:p>
           <a:p>
             <a:pPr lvl="1"/>
             <a:r>
               <a:rPr lang="en-US" dirty="0" smtClean="0"/>
-              <a:t>Accountants, Lawyers, Intl hackers</a:t>
+              <a:t>Shifting </a:t>
+            </a:r>
+            <a:r>
+              <a:rPr lang="en-US" dirty="0" smtClean="0"/>
+              <a:t>from focusing on individual performance to</a:t>
+            </a:r>
+          </a:p>
+          <a:p>
+            <a:r>
+              <a:rPr lang="en-US" dirty="0" smtClean="0"/>
+              <a:t>To </a:t>
+            </a:r>
+            <a:r>
+              <a:rPr lang="en-US" dirty="0" smtClean="0"/>
+              <a:t>Dynamic Content/Moving Targets:</a:t>
             </a:r>
           </a:p>
           <a:p>
             <a:pPr lvl="1"/>
             <a:r>
               <a:rPr lang="en-US" dirty="0" smtClean="0"/>
-              <a:t>Government officers, scientists and Social Workers</a:t>
-            </a:r>
-          </a:p>
-          <a:p>
-            <a:pPr lvl="1"/>
-            <a:r>
-              <a:rPr lang="en-US" dirty="0" smtClean="0"/>
-              <a:t>Public Media Agencies</a:t>
-            </a:r>
-          </a:p>
-          <a:p>
-            <a:r>
-              <a:rPr lang="en-US" dirty="0" smtClean="0"/>
-              <a:t>Mission Design stage, the Process is being</a:t>
-            </a:r>
-          </a:p>
-          <a:p>
-            <a:pPr lvl="1"/>
-            <a:r>
-              <a:rPr lang="en-US" dirty="0" smtClean="0"/>
-              <a:t>DIGITALLY RECORDED using GIT</a:t>
-            </a:r>
+              <a:t>Focus </a:t>
+            </a:r>
+            <a:r>
+              <a:rPr lang="en-US" dirty="0" smtClean="0"/>
+              <a:t>on the school providing a rich context for students to try out their most daring </a:t>
+            </a:r>
+            <a:r>
+              <a:rPr lang="en-US" dirty="0" err="1" smtClean="0"/>
+              <a:t>fantacies</a:t>
+            </a:r>
+            <a:r>
+              <a:rPr lang="en-US" dirty="0"/>
+              <a:t> </a:t>
+            </a:r>
+            <a:r>
+              <a:rPr lang="en-US" dirty="0" smtClean="0"/>
+              <a:t>in a safe manner</a:t>
+            </a:r>
+          </a:p>
+          <a:p>
+            <a:endParaRPr lang="en-US" dirty="0"/>
           </a:p>
         </p:txBody>
       </p:sp>
     </p:spTree>
     <p:extLst>
       <p:ext uri="{BB962C8B-B14F-4D97-AF65-F5344CB8AC3E}">
-        <p14:creationId xmlns:p14="http://schemas.microsoft.com/office/powerpoint/2010/main" val="1243117391"/>
+        <p14:creationId xmlns:p14="http://schemas.microsoft.com/office/powerpoint/2010/main" val="3783023776"/>
       </p:ext>
     </p:extLst>
   </p:cSld>
@@ -4138,7 +4316,7 @@
           <a:p>
             <a:r>
               <a:rPr lang="en-US" dirty="0" smtClean="0"/>
-              <a:t>Learning Activity Formats</a:t>
+              <a:t>Mission Design</a:t>
             </a:r>
             <a:endParaRPr lang="en-US" dirty="0"/>
           </a:p>
@@ -4157,58 +4335,71 @@
         <p:spPr/>
         <p:txBody>
           <a:bodyPr>
-            <a:normAutofit/>
+            <a:normAutofit fontScale="92500" lnSpcReduction="20000"/>
           </a:bodyPr>
           <a:lstStyle/>
           <a:p>
             <a:r>
               <a:rPr lang="en-US" dirty="0" smtClean="0"/>
-              <a:t>24-80 hour consecutive mission execution</a:t>
-            </a:r>
-          </a:p>
-          <a:p>
-            <a:r>
-              <a:rPr lang="en-US" dirty="0" err="1" smtClean="0"/>
-              <a:t>Hackathon</a:t>
-            </a:r>
-            <a:r>
-              <a:rPr lang="en-US" dirty="0" smtClean="0"/>
-              <a:t>-like courses</a:t>
-            </a:r>
-          </a:p>
-          <a:p>
-            <a:r>
-              <a:rPr lang="en-US" dirty="0" smtClean="0"/>
-              <a:t>Difference</a:t>
+              <a:t>Experts guide </a:t>
+            </a:r>
+            <a:r>
+              <a:rPr lang="en-US" dirty="0" smtClean="0"/>
+              <a:t>students to write Mission Statements</a:t>
+            </a:r>
+          </a:p>
+          <a:p>
+            <a:r>
+              <a:rPr lang="en-US" dirty="0" smtClean="0"/>
+              <a:t>It takes 3-5 months, including testing out the operational plans. </a:t>
+            </a:r>
+          </a:p>
+          <a:p>
+            <a:r>
+              <a:rPr lang="en-US" dirty="0" smtClean="0"/>
+              <a:t>Participants</a:t>
             </a:r>
           </a:p>
           <a:p>
             <a:pPr lvl="1"/>
             <a:r>
               <a:rPr lang="en-US" dirty="0" smtClean="0"/>
-              <a:t>Not a zero-sum competition</a:t>
+              <a:t>Accountants, Lawyers, Intl hackers</a:t>
             </a:r>
           </a:p>
           <a:p>
             <a:pPr lvl="1"/>
             <a:r>
               <a:rPr lang="en-US" dirty="0" smtClean="0"/>
-              <a:t>Banks that issues </a:t>
-            </a:r>
-            <a:r>
-              <a:rPr lang="en-US" dirty="0" err="1" smtClean="0"/>
-              <a:t>BitCoins</a:t>
-            </a:r>
-            <a:r>
-              <a:rPr lang="en-US" dirty="0" smtClean="0"/>
-              <a:t>, Court Rooms, Patent Offices, and Technology Services on site</a:t>
+              <a:t>Government officers, scientists and Social Workers</a:t>
             </a:r>
           </a:p>
           <a:p>
             <a:pPr lvl="1"/>
             <a:r>
               <a:rPr lang="en-US" dirty="0" smtClean="0"/>
-              <a:t>Recombine Teams and Results to create a coherent demonstration at the end</a:t>
+              <a:t>Public Media Agencies</a:t>
+            </a:r>
+          </a:p>
+          <a:p>
+            <a:r>
+              <a:rPr lang="en-US" dirty="0" smtClean="0"/>
+              <a:t>Mission Design stage, the Process </a:t>
+            </a:r>
+            <a:r>
+              <a:rPr lang="en-US" dirty="0" smtClean="0"/>
+              <a:t>is already </a:t>
+            </a:r>
+            <a:r>
+              <a:rPr lang="en-US" dirty="0" smtClean="0"/>
+              <a:t>being</a:t>
+            </a:r>
+          </a:p>
+          <a:p>
+            <a:pPr lvl="1"/>
+            <a:r>
+              <a:rPr lang="en-US" dirty="0" smtClean="0"/>
+              <a:t>DIGITALLY RECORDED using GIT</a:t>
             </a:r>
           </a:p>
         </p:txBody>
@@ -4216,7 +4407,7 @@
     </p:spTree>
     <p:extLst>
       <p:ext uri="{BB962C8B-B14F-4D97-AF65-F5344CB8AC3E}">
-        <p14:creationId xmlns:p14="http://schemas.microsoft.com/office/powerpoint/2010/main" val="2051848274"/>
+        <p14:creationId xmlns:p14="http://schemas.microsoft.com/office/powerpoint/2010/main" val="1243117391"/>
       </p:ext>
     </p:extLst>
   </p:cSld>
@@ -4262,6 +4453,29 @@
         </p:nvSpPr>
         <p:spPr/>
         <p:txBody>
+          <a:bodyPr/>
+          <a:lstStyle/>
+          <a:p>
+            <a:r>
+              <a:rPr lang="en-US" dirty="0" smtClean="0"/>
+              <a:t>Learning Activity Formats</a:t>
+            </a:r>
+            <a:endParaRPr lang="en-US" dirty="0"/>
+          </a:p>
+        </p:txBody>
+      </p:sp>
+      <p:sp>
+        <p:nvSpPr>
+          <p:cNvPr id="3" name="Content Placeholder 2"/>
+          <p:cNvSpPr>
+            <a:spLocks noGrp="1"/>
+          </p:cNvSpPr>
+          <p:nvPr>
+            <p:ph idx="1"/>
+          </p:nvPr>
+        </p:nvSpPr>
+        <p:spPr/>
+        <p:txBody>
           <a:bodyPr>
             <a:normAutofit/>
           </a:bodyPr>
@@ -4269,86 +4483,60 @@
           <a:p>
             <a:r>
               <a:rPr lang="en-US" dirty="0" smtClean="0"/>
-              <a:t>Traditional Courses</a:t>
-            </a:r>
-            <a:endParaRPr lang="en-US" dirty="0"/>
-          </a:p>
-        </p:txBody>
-      </p:sp>
-      <p:sp>
-        <p:nvSpPr>
-          <p:cNvPr id="3" name="Content Placeholder 2"/>
-          <p:cNvSpPr>
-            <a:spLocks noGrp="1"/>
-          </p:cNvSpPr>
-          <p:nvPr>
-            <p:ph idx="1"/>
-          </p:nvPr>
-        </p:nvSpPr>
-        <p:spPr/>
-        <p:txBody>
-          <a:bodyPr>
-            <a:normAutofit lnSpcReduction="10000"/>
-          </a:bodyPr>
-          <a:lstStyle/>
-          <a:p>
-            <a:r>
-              <a:rPr lang="en-US" dirty="0" smtClean="0"/>
-              <a:t>2 year </a:t>
-            </a:r>
-            <a:r>
-              <a:rPr lang="en-US" dirty="0"/>
-              <a:t>A</a:t>
-            </a:r>
-            <a:r>
-              <a:rPr lang="en-US" dirty="0" smtClean="0"/>
-              <a:t>ssociate Degree Program</a:t>
-            </a:r>
-          </a:p>
-          <a:p>
-            <a:r>
-              <a:rPr lang="en-US" dirty="0" smtClean="0"/>
-              <a:t>Mission-based Learning Program</a:t>
-            </a:r>
-          </a:p>
-          <a:p>
-            <a:r>
-              <a:rPr lang="en-US" dirty="0" smtClean="0"/>
-              <a:t>Curriculum</a:t>
+              <a:t>24-80 </a:t>
+            </a:r>
+            <a:r>
+              <a:rPr lang="en-US" dirty="0" smtClean="0"/>
+              <a:t>consecutive hour </a:t>
+            </a:r>
+            <a:r>
+              <a:rPr lang="en-US" dirty="0" smtClean="0"/>
+              <a:t>mission execution</a:t>
+            </a:r>
+          </a:p>
+          <a:p>
+            <a:r>
+              <a:rPr lang="en-US" dirty="0" err="1" smtClean="0"/>
+              <a:t>Hackathon</a:t>
+            </a:r>
+            <a:r>
+              <a:rPr lang="en-US" dirty="0" smtClean="0"/>
+              <a:t>-like courses</a:t>
+            </a:r>
+          </a:p>
+          <a:p>
+            <a:r>
+              <a:rPr lang="en-US" dirty="0" smtClean="0"/>
+              <a:t>Difference</a:t>
             </a:r>
           </a:p>
           <a:p>
             <a:pPr lvl="1"/>
             <a:r>
               <a:rPr lang="en-US" dirty="0" smtClean="0"/>
-              <a:t>80 hour Orientation Program</a:t>
+              <a:t>Not a zero-sum competition</a:t>
             </a:r>
           </a:p>
           <a:p>
             <a:pPr lvl="1"/>
             <a:r>
               <a:rPr lang="en-US" dirty="0" smtClean="0"/>
-              <a:t>Technology/Laboratory Exploration program</a:t>
+              <a:t>Banks that issues </a:t>
+            </a:r>
+            <a:r>
+              <a:rPr lang="en-US" dirty="0" err="1" smtClean="0"/>
+              <a:t>BitCoins</a:t>
+            </a:r>
+            <a:r>
+              <a:rPr lang="en-US" dirty="0" smtClean="0"/>
+              <a:t>, Court Rooms, Patent Offices, and Technology Services on site</a:t>
             </a:r>
           </a:p>
           <a:p>
             <a:pPr lvl="1"/>
             <a:r>
               <a:rPr lang="en-US" dirty="0" smtClean="0"/>
-              <a:t>Career Planning Strategy course</a:t>
-            </a:r>
-          </a:p>
-          <a:p>
-            <a:pPr lvl="1"/>
-            <a:r>
-              <a:rPr lang="en-US" dirty="0" smtClean="0"/>
-              <a:t>Product/service Development Course</a:t>
-            </a:r>
-          </a:p>
-          <a:p>
-            <a:r>
-              <a:rPr lang="en-US" dirty="0" smtClean="0"/>
-              <a:t>Product Announcement Events and Publication Channels</a:t>
+              <a:t>Recombine Teams and Results to create a coherent demonstration at the end</a:t>
             </a:r>
           </a:p>
         </p:txBody>
@@ -4356,7 +4544,7 @@
     </p:spTree>
     <p:extLst>
       <p:ext uri="{BB962C8B-B14F-4D97-AF65-F5344CB8AC3E}">
-        <p14:creationId xmlns:p14="http://schemas.microsoft.com/office/powerpoint/2010/main" val="3006670925"/>
+        <p14:creationId xmlns:p14="http://schemas.microsoft.com/office/powerpoint/2010/main" val="2051848274"/>
       </p:ext>
     </p:extLst>
   </p:cSld>
@@ -4402,33 +4590,6 @@
         </p:nvSpPr>
         <p:spPr/>
         <p:txBody>
-          <a:bodyPr/>
-          <a:lstStyle/>
-          <a:p>
-            <a:r>
-              <a:rPr lang="en-US" dirty="0" smtClean="0"/>
-              <a:t>XLP </a:t>
-            </a:r>
-            <a:r>
-              <a:rPr lang="en-US" dirty="0" err="1" smtClean="0"/>
-              <a:t>Practioners</a:t>
-            </a:r>
-            <a:endParaRPr lang="en-US" dirty="0"/>
-          </a:p>
-        </p:txBody>
-      </p:sp>
-      <p:sp>
-        <p:nvSpPr>
-          <p:cNvPr id="3" name="Content Placeholder 2"/>
-          <p:cNvSpPr>
-            <a:spLocks noGrp="1"/>
-          </p:cNvSpPr>
-          <p:nvPr>
-            <p:ph idx="1"/>
-          </p:nvPr>
-        </p:nvSpPr>
-        <p:spPr/>
-        <p:txBody>
           <a:bodyPr>
             <a:normAutofit/>
           </a:bodyPr>
@@ -4436,46 +4597,94 @@
           <a:p>
             <a:r>
               <a:rPr lang="en-US" dirty="0" smtClean="0"/>
-              <a:t>Middle Schools</a:t>
-            </a:r>
-          </a:p>
-          <a:p>
-            <a:r>
-              <a:rPr lang="en-US" dirty="0" smtClean="0"/>
-              <a:t>High Schools</a:t>
-            </a:r>
-          </a:p>
-          <a:p>
-            <a:r>
-              <a:rPr lang="en-US" dirty="0" smtClean="0"/>
-              <a:t>Vocational Schools</a:t>
-            </a:r>
-          </a:p>
-          <a:p>
-            <a:r>
-              <a:rPr lang="en-US" dirty="0" smtClean="0"/>
-              <a:t>Universities</a:t>
-            </a:r>
-          </a:p>
-          <a:p>
-            <a:r>
-              <a:rPr lang="en-US" dirty="0" smtClean="0"/>
-              <a:t>Agencies that offers Crowd Sourcing and Crowd Funding opportunities</a:t>
-            </a:r>
-          </a:p>
-          <a:p>
-            <a:r>
-              <a:rPr lang="en-US" dirty="0" smtClean="0"/>
-              <a:t>Government Agencies, UNESCO</a:t>
+              <a:t>Traditional Courses</a:t>
             </a:r>
             <a:endParaRPr lang="en-US" dirty="0"/>
+          </a:p>
+        </p:txBody>
+      </p:sp>
+      <p:sp>
+        <p:nvSpPr>
+          <p:cNvPr id="3" name="Content Placeholder 2"/>
+          <p:cNvSpPr>
+            <a:spLocks noGrp="1"/>
+          </p:cNvSpPr>
+          <p:nvPr>
+            <p:ph idx="1"/>
+          </p:nvPr>
+        </p:nvSpPr>
+        <p:spPr/>
+        <p:txBody>
+          <a:bodyPr>
+            <a:normAutofit lnSpcReduction="10000"/>
+          </a:bodyPr>
+          <a:lstStyle/>
+          <a:p>
+            <a:r>
+              <a:rPr lang="en-US" dirty="0" smtClean="0"/>
+              <a:t>2 year </a:t>
+            </a:r>
+            <a:r>
+              <a:rPr lang="en-US" dirty="0"/>
+              <a:t>A</a:t>
+            </a:r>
+            <a:r>
+              <a:rPr lang="en-US" dirty="0" smtClean="0"/>
+              <a:t>ssociate Degree Program</a:t>
+            </a:r>
+          </a:p>
+          <a:p>
+            <a:r>
+              <a:rPr lang="en-US" dirty="0" smtClean="0"/>
+              <a:t>Mission-based Learning Program</a:t>
+            </a:r>
+          </a:p>
+          <a:p>
+            <a:r>
+              <a:rPr lang="en-US" dirty="0" smtClean="0"/>
+              <a:t>Curriculum</a:t>
+            </a:r>
+          </a:p>
+          <a:p>
+            <a:pPr lvl="1"/>
+            <a:r>
+              <a:rPr lang="en-US" dirty="0" smtClean="0"/>
+              <a:t>80 hour Orientation Program</a:t>
+            </a:r>
+          </a:p>
+          <a:p>
+            <a:pPr lvl="1"/>
+            <a:r>
+              <a:rPr lang="en-US" dirty="0" smtClean="0"/>
+              <a:t>Technology/Laboratory Exploration program</a:t>
+            </a:r>
+          </a:p>
+          <a:p>
+            <a:pPr lvl="1"/>
+            <a:r>
+              <a:rPr lang="en-US" dirty="0" smtClean="0"/>
+              <a:t>Career Planning Strategy course</a:t>
+            </a:r>
+          </a:p>
+          <a:p>
+            <a:pPr lvl="1"/>
+            <a:r>
+              <a:rPr lang="en-US" dirty="0" smtClean="0"/>
+              <a:t>Product/service Development Course</a:t>
+            </a:r>
+          </a:p>
+          <a:p>
+            <a:r>
+              <a:rPr lang="en-US" dirty="0" smtClean="0"/>
+              <a:t>Product Announcement Events and Publication Channels</a:t>
+            </a:r>
           </a:p>
         </p:txBody>
       </p:sp>
     </p:spTree>
     <p:extLst>
       <p:ext uri="{BB962C8B-B14F-4D97-AF65-F5344CB8AC3E}">
-        <p14:creationId xmlns:p14="http://schemas.microsoft.com/office/powerpoint/2010/main" val="2348128616"/>
+        <p14:creationId xmlns:p14="http://schemas.microsoft.com/office/powerpoint/2010/main" val="3006670925"/>
       </p:ext>
     </p:extLst>
   </p:cSld>
@@ -4526,7 +4735,11 @@
           <a:p>
             <a:r>
               <a:rPr lang="en-US" dirty="0" smtClean="0"/>
-              <a:t>Example 1</a:t>
+              <a:t>XLP </a:t>
+            </a:r>
+            <a:r>
+              <a:rPr lang="en-US" dirty="0" err="1" smtClean="0"/>
+              <a:t>Practioners</a:t>
             </a:r>
             <a:endParaRPr lang="en-US" dirty="0"/>
           </a:p>
@@ -4544,44 +4757,45 @@
         </p:nvSpPr>
         <p:spPr/>
         <p:txBody>
-          <a:bodyPr/>
-          <a:lstStyle/>
-          <a:p>
-            <a:r>
-              <a:rPr lang="en-US" dirty="0" smtClean="0"/>
-              <a:t>Unmanned Island Exploration</a:t>
-            </a:r>
-          </a:p>
-          <a:p>
-            <a:pPr lvl="1"/>
-            <a:r>
-              <a:rPr lang="en-US" dirty="0" smtClean="0"/>
-              <a:t>Functional Prototypes, using industry strength technology solutions</a:t>
-            </a:r>
-          </a:p>
-          <a:p>
-            <a:pPr lvl="1"/>
-            <a:r>
-              <a:rPr lang="en-US" dirty="0" smtClean="0"/>
-              <a:t>Promotional Videos and</a:t>
-            </a:r>
-          </a:p>
-          <a:p>
-            <a:pPr lvl="1"/>
-            <a:r>
-              <a:rPr lang="en-US" dirty="0" smtClean="0"/>
-              <a:t>Write Budgets and Operational Proposals</a:t>
-            </a:r>
-          </a:p>
-          <a:p>
-            <a:pPr lvl="1"/>
-            <a:r>
-              <a:rPr lang="en-US" dirty="0" smtClean="0"/>
-              <a:t>International Dispute Resolution Procedures</a:t>
-            </a:r>
-          </a:p>
-          <a:p>
-            <a:pPr lvl="1"/>
+          <a:bodyPr>
+            <a:normAutofit/>
+          </a:bodyPr>
+          <a:lstStyle/>
+          <a:p>
+            <a:r>
+              <a:rPr lang="en-US" dirty="0" smtClean="0"/>
+              <a:t>Middle Schools</a:t>
+            </a:r>
+          </a:p>
+          <a:p>
+            <a:r>
+              <a:rPr lang="en-US" dirty="0" smtClean="0"/>
+              <a:t>High Schools</a:t>
+            </a:r>
+          </a:p>
+          <a:p>
+            <a:r>
+              <a:rPr lang="en-US" dirty="0" smtClean="0"/>
+              <a:t>Vocational Schools</a:t>
+            </a:r>
+          </a:p>
+          <a:p>
+            <a:r>
+              <a:rPr lang="en-US" dirty="0" smtClean="0"/>
+              <a:t>Universities</a:t>
+            </a:r>
+          </a:p>
+          <a:p>
+            <a:r>
+              <a:rPr lang="en-US" dirty="0" smtClean="0"/>
+              <a:t>Agencies that offers Crowd Sourcing and Crowd Funding opportunities</a:t>
+            </a:r>
+          </a:p>
+          <a:p>
+            <a:r>
+              <a:rPr lang="en-US" dirty="0" smtClean="0"/>
+              <a:t>Government Agencies, UNESCO</a:t>
+            </a:r>
             <a:endParaRPr lang="en-US" dirty="0"/>
           </a:p>
         </p:txBody>
@@ -4589,7 +4803,7 @@
     </p:spTree>
     <p:extLst>
       <p:ext uri="{BB962C8B-B14F-4D97-AF65-F5344CB8AC3E}">
-        <p14:creationId xmlns:p14="http://schemas.microsoft.com/office/powerpoint/2010/main" val="1810960128"/>
+        <p14:creationId xmlns:p14="http://schemas.microsoft.com/office/powerpoint/2010/main" val="2348128616"/>
       </p:ext>
     </p:extLst>
   </p:cSld>

</xml_diff>